<commit_message>
fix tesi + pre v2.1
</commit_message>
<xml_diff>
--- a/presentazione/Pagliari Lorenzo - presentazione.pptx
+++ b/presentazione/Pagliari Lorenzo - presentazione.pptx
@@ -251,7 +251,7 @@
             <a:fld id="{3012F1C6-8193-4D58-BB28-44CF9C7F83D5}" type="datetimeFigureOut">
               <a:rPr lang="it-IT" smtClean="0"/>
               <a:pPr/>
-              <a:t>15/09/2015</a:t>
+              <a:t>16/09/2015</a:t>
             </a:fld>
             <a:endParaRPr lang="it-IT"/>
           </a:p>
@@ -413,7 +413,7 @@
             <a:fld id="{0A055084-1CB9-CF40-93F3-663EB9ADEB9C}" type="datetimeFigureOut">
               <a:rPr lang="it-IT" smtClean="0"/>
               <a:pPr/>
-              <a:t>15/09/2015</a:t>
+              <a:t>16/09/2015</a:t>
             </a:fld>
             <a:endParaRPr lang="it-IT"/>
           </a:p>
@@ -582,7 +582,7 @@
     </p:spTree>
     <p:extLst>
       <p:ext uri="{BB962C8B-B14F-4D97-AF65-F5344CB8AC3E}">
-        <p14:creationId xmlns:p14="http://schemas.microsoft.com/office/powerpoint/2010/main" xmlns="" val="983607612"/>
+        <p14:creationId xmlns="" xmlns:p14="http://schemas.microsoft.com/office/powerpoint/2010/main" val="983607612"/>
       </p:ext>
     </p:extLst>
   </p:cSld>
@@ -762,7 +762,7 @@
     </p:spTree>
     <p:extLst>
       <p:ext uri="{BB962C8B-B14F-4D97-AF65-F5344CB8AC3E}">
-        <p14:creationId xmlns:p14="http://schemas.microsoft.com/office/powerpoint/2010/main" xmlns="" val="1229878964"/>
+        <p14:creationId xmlns="" xmlns:p14="http://schemas.microsoft.com/office/powerpoint/2010/main" val="1229878964"/>
       </p:ext>
     </p:extLst>
   </p:cSld>
@@ -873,7 +873,7 @@
     </p:spTree>
     <p:extLst>
       <p:ext uri="{BB962C8B-B14F-4D97-AF65-F5344CB8AC3E}">
-        <p14:creationId xmlns:p14="http://schemas.microsoft.com/office/powerpoint/2010/main" xmlns="" val="650065356"/>
+        <p14:creationId xmlns="" xmlns:p14="http://schemas.microsoft.com/office/powerpoint/2010/main" val="650065356"/>
       </p:ext>
     </p:extLst>
   </p:cSld>
@@ -984,7 +984,7 @@
     </p:spTree>
     <p:extLst>
       <p:ext uri="{BB962C8B-B14F-4D97-AF65-F5344CB8AC3E}">
-        <p14:creationId xmlns:p14="http://schemas.microsoft.com/office/powerpoint/2010/main" xmlns="" val="650065356"/>
+        <p14:creationId xmlns="" xmlns:p14="http://schemas.microsoft.com/office/powerpoint/2010/main" val="650065356"/>
       </p:ext>
     </p:extLst>
   </p:cSld>
@@ -1074,7 +1074,7 @@
     </p:spTree>
     <p:extLst>
       <p:ext uri="{BB962C8B-B14F-4D97-AF65-F5344CB8AC3E}">
-        <p14:creationId xmlns:p14="http://schemas.microsoft.com/office/powerpoint/2010/main" xmlns="" val="70992606"/>
+        <p14:creationId xmlns="" xmlns:p14="http://schemas.microsoft.com/office/powerpoint/2010/main" val="70992606"/>
       </p:ext>
     </p:extLst>
   </p:cSld>
@@ -1185,7 +1185,7 @@
     </p:spTree>
     <p:extLst>
       <p:ext uri="{BB962C8B-B14F-4D97-AF65-F5344CB8AC3E}">
-        <p14:creationId xmlns:p14="http://schemas.microsoft.com/office/powerpoint/2010/main" xmlns="" val="650065356"/>
+        <p14:creationId xmlns="" xmlns:p14="http://schemas.microsoft.com/office/powerpoint/2010/main" val="650065356"/>
       </p:ext>
     </p:extLst>
   </p:cSld>
@@ -1296,7 +1296,7 @@
     </p:spTree>
     <p:extLst>
       <p:ext uri="{BB962C8B-B14F-4D97-AF65-F5344CB8AC3E}">
-        <p14:creationId xmlns:p14="http://schemas.microsoft.com/office/powerpoint/2010/main" xmlns="" val="650065356"/>
+        <p14:creationId xmlns="" xmlns:p14="http://schemas.microsoft.com/office/powerpoint/2010/main" val="650065356"/>
       </p:ext>
     </p:extLst>
   </p:cSld>
@@ -1407,7 +1407,7 @@
     </p:spTree>
     <p:extLst>
       <p:ext uri="{BB962C8B-B14F-4D97-AF65-F5344CB8AC3E}">
-        <p14:creationId xmlns:p14="http://schemas.microsoft.com/office/powerpoint/2010/main" xmlns="" val="650065356"/>
+        <p14:creationId xmlns="" xmlns:p14="http://schemas.microsoft.com/office/powerpoint/2010/main" val="650065356"/>
       </p:ext>
     </p:extLst>
   </p:cSld>
@@ -1497,7 +1497,7 @@
     </p:spTree>
     <p:extLst>
       <p:ext uri="{BB962C8B-B14F-4D97-AF65-F5344CB8AC3E}">
-        <p14:creationId xmlns:p14="http://schemas.microsoft.com/office/powerpoint/2010/main" xmlns="" val="70992606"/>
+        <p14:creationId xmlns="" xmlns:p14="http://schemas.microsoft.com/office/powerpoint/2010/main" val="70992606"/>
       </p:ext>
     </p:extLst>
   </p:cSld>
@@ -1608,7 +1608,7 @@
     </p:spTree>
     <p:extLst>
       <p:ext uri="{BB962C8B-B14F-4D97-AF65-F5344CB8AC3E}">
-        <p14:creationId xmlns:p14="http://schemas.microsoft.com/office/powerpoint/2010/main" xmlns="" val="650065356"/>
+        <p14:creationId xmlns="" xmlns:p14="http://schemas.microsoft.com/office/powerpoint/2010/main" val="650065356"/>
       </p:ext>
     </p:extLst>
   </p:cSld>
@@ -1719,7 +1719,7 @@
     </p:spTree>
     <p:extLst>
       <p:ext uri="{BB962C8B-B14F-4D97-AF65-F5344CB8AC3E}">
-        <p14:creationId xmlns:p14="http://schemas.microsoft.com/office/powerpoint/2010/main" xmlns="" val="650065356"/>
+        <p14:creationId xmlns="" xmlns:p14="http://schemas.microsoft.com/office/powerpoint/2010/main" val="650065356"/>
       </p:ext>
     </p:extLst>
   </p:cSld>
@@ -1809,7 +1809,7 @@
     </p:spTree>
     <p:extLst>
       <p:ext uri="{BB962C8B-B14F-4D97-AF65-F5344CB8AC3E}">
-        <p14:creationId xmlns:p14="http://schemas.microsoft.com/office/powerpoint/2010/main" xmlns="" val="70992606"/>
+        <p14:creationId xmlns="" xmlns:p14="http://schemas.microsoft.com/office/powerpoint/2010/main" val="70992606"/>
       </p:ext>
     </p:extLst>
   </p:cSld>
@@ -1899,7 +1899,7 @@
     </p:spTree>
     <p:extLst>
       <p:ext uri="{BB962C8B-B14F-4D97-AF65-F5344CB8AC3E}">
-        <p14:creationId xmlns:p14="http://schemas.microsoft.com/office/powerpoint/2010/main" xmlns="" val="70992606"/>
+        <p14:creationId xmlns="" xmlns:p14="http://schemas.microsoft.com/office/powerpoint/2010/main" val="70992606"/>
       </p:ext>
     </p:extLst>
   </p:cSld>
@@ -2010,7 +2010,7 @@
     </p:spTree>
     <p:extLst>
       <p:ext uri="{BB962C8B-B14F-4D97-AF65-F5344CB8AC3E}">
-        <p14:creationId xmlns:p14="http://schemas.microsoft.com/office/powerpoint/2010/main" xmlns="" val="650065356"/>
+        <p14:creationId xmlns="" xmlns:p14="http://schemas.microsoft.com/office/powerpoint/2010/main" val="650065356"/>
       </p:ext>
     </p:extLst>
   </p:cSld>
@@ -2100,7 +2100,7 @@
     </p:spTree>
     <p:extLst>
       <p:ext uri="{BB962C8B-B14F-4D97-AF65-F5344CB8AC3E}">
-        <p14:creationId xmlns:p14="http://schemas.microsoft.com/office/powerpoint/2010/main" xmlns="" val="70992606"/>
+        <p14:creationId xmlns="" xmlns:p14="http://schemas.microsoft.com/office/powerpoint/2010/main" val="70992606"/>
       </p:ext>
     </p:extLst>
   </p:cSld>
@@ -2190,7 +2190,7 @@
     </p:spTree>
     <p:extLst>
       <p:ext uri="{BB962C8B-B14F-4D97-AF65-F5344CB8AC3E}">
-        <p14:creationId xmlns:p14="http://schemas.microsoft.com/office/powerpoint/2010/main" xmlns="" val="70992606"/>
+        <p14:creationId xmlns="" xmlns:p14="http://schemas.microsoft.com/office/powerpoint/2010/main" val="70992606"/>
       </p:ext>
     </p:extLst>
   </p:cSld>
@@ -2297,7 +2297,7 @@
     </p:spTree>
     <p:extLst>
       <p:ext uri="{BB962C8B-B14F-4D97-AF65-F5344CB8AC3E}">
-        <p14:creationId xmlns:p14="http://schemas.microsoft.com/office/powerpoint/2010/main" xmlns="" val="2864582512"/>
+        <p14:creationId xmlns="" xmlns:p14="http://schemas.microsoft.com/office/powerpoint/2010/main" val="2864582512"/>
       </p:ext>
     </p:extLst>
   </p:cSld>
@@ -2387,7 +2387,7 @@
     </p:spTree>
     <p:extLst>
       <p:ext uri="{BB962C8B-B14F-4D97-AF65-F5344CB8AC3E}">
-        <p14:creationId xmlns:p14="http://schemas.microsoft.com/office/powerpoint/2010/main" xmlns="" val="70992606"/>
+        <p14:creationId xmlns="" xmlns:p14="http://schemas.microsoft.com/office/powerpoint/2010/main" val="70992606"/>
       </p:ext>
     </p:extLst>
   </p:cSld>
@@ -2496,7 +2496,7 @@
     </p:spTree>
     <p:extLst>
       <p:ext uri="{BB962C8B-B14F-4D97-AF65-F5344CB8AC3E}">
-        <p14:creationId xmlns:p14="http://schemas.microsoft.com/office/powerpoint/2010/main" xmlns="" val="2759415330"/>
+        <p14:creationId xmlns="" xmlns:p14="http://schemas.microsoft.com/office/powerpoint/2010/main" val="2759415330"/>
       </p:ext>
     </p:extLst>
   </p:cSld>
@@ -2586,7 +2586,7 @@
     </p:spTree>
     <p:extLst>
       <p:ext uri="{BB962C8B-B14F-4D97-AF65-F5344CB8AC3E}">
-        <p14:creationId xmlns:p14="http://schemas.microsoft.com/office/powerpoint/2010/main" xmlns="" val="70992606"/>
+        <p14:creationId xmlns="" xmlns:p14="http://schemas.microsoft.com/office/powerpoint/2010/main" val="70992606"/>
       </p:ext>
     </p:extLst>
   </p:cSld>
@@ -2697,7 +2697,7 @@
     </p:spTree>
     <p:extLst>
       <p:ext uri="{BB962C8B-B14F-4D97-AF65-F5344CB8AC3E}">
-        <p14:creationId xmlns:p14="http://schemas.microsoft.com/office/powerpoint/2010/main" xmlns="" val="650065356"/>
+        <p14:creationId xmlns="" xmlns:p14="http://schemas.microsoft.com/office/powerpoint/2010/main" val="650065356"/>
       </p:ext>
     </p:extLst>
   </p:cSld>
@@ -2808,7 +2808,7 @@
     </p:spTree>
     <p:extLst>
       <p:ext uri="{BB962C8B-B14F-4D97-AF65-F5344CB8AC3E}">
-        <p14:creationId xmlns:p14="http://schemas.microsoft.com/office/powerpoint/2010/main" xmlns="" val="650065356"/>
+        <p14:creationId xmlns="" xmlns:p14="http://schemas.microsoft.com/office/powerpoint/2010/main" val="650065356"/>
       </p:ext>
     </p:extLst>
   </p:cSld>
@@ -2919,7 +2919,7 @@
     </p:spTree>
     <p:extLst>
       <p:ext uri="{BB962C8B-B14F-4D97-AF65-F5344CB8AC3E}">
-        <p14:creationId xmlns:p14="http://schemas.microsoft.com/office/powerpoint/2010/main" xmlns="" val="650065356"/>
+        <p14:creationId xmlns="" xmlns:p14="http://schemas.microsoft.com/office/powerpoint/2010/main" val="650065356"/>
       </p:ext>
     </p:extLst>
   </p:cSld>
@@ -3009,7 +3009,7 @@
     </p:spTree>
     <p:extLst>
       <p:ext uri="{BB962C8B-B14F-4D97-AF65-F5344CB8AC3E}">
-        <p14:creationId xmlns:p14="http://schemas.microsoft.com/office/powerpoint/2010/main" xmlns="" val="70992606"/>
+        <p14:creationId xmlns="" xmlns:p14="http://schemas.microsoft.com/office/powerpoint/2010/main" val="70992606"/>
       </p:ext>
     </p:extLst>
   </p:cSld>
@@ -3171,7 +3171,7 @@
     </p:spTree>
     <p:extLst>
       <p:ext uri="{BB962C8B-B14F-4D97-AF65-F5344CB8AC3E}">
-        <p14:creationId xmlns:p14="http://schemas.microsoft.com/office/powerpoint/2010/main" xmlns="" val="27430096"/>
+        <p14:creationId xmlns="" xmlns:p14="http://schemas.microsoft.com/office/powerpoint/2010/main" val="27430096"/>
       </p:ext>
     </p:extLst>
   </p:cSld>
@@ -3289,7 +3289,7 @@
     </p:spTree>
     <p:extLst>
       <p:ext uri="{BB962C8B-B14F-4D97-AF65-F5344CB8AC3E}">
-        <p14:creationId xmlns:p14="http://schemas.microsoft.com/office/powerpoint/2010/main" xmlns="" val="1473926903"/>
+        <p14:creationId xmlns="" xmlns:p14="http://schemas.microsoft.com/office/powerpoint/2010/main" val="1473926903"/>
       </p:ext>
     </p:extLst>
   </p:cSld>
@@ -3407,7 +3407,7 @@
     </p:spTree>
     <p:extLst>
       <p:ext uri="{BB962C8B-B14F-4D97-AF65-F5344CB8AC3E}">
-        <p14:creationId xmlns:p14="http://schemas.microsoft.com/office/powerpoint/2010/main" xmlns="" val="1681231856"/>
+        <p14:creationId xmlns="" xmlns:p14="http://schemas.microsoft.com/office/powerpoint/2010/main" val="1681231856"/>
       </p:ext>
     </p:extLst>
   </p:cSld>
@@ -3569,7 +3569,7 @@
     </p:spTree>
     <p:extLst>
       <p:ext uri="{BB962C8B-B14F-4D97-AF65-F5344CB8AC3E}">
-        <p14:creationId xmlns:p14="http://schemas.microsoft.com/office/powerpoint/2010/main" xmlns="" val="27430096"/>
+        <p14:creationId xmlns="" xmlns:p14="http://schemas.microsoft.com/office/powerpoint/2010/main" val="27430096"/>
       </p:ext>
     </p:extLst>
   </p:cSld>
@@ -3622,7 +3622,7 @@
     </p:spTree>
     <p:extLst>
       <p:ext uri="{BB962C8B-B14F-4D97-AF65-F5344CB8AC3E}">
-        <p14:creationId xmlns:p14="http://schemas.microsoft.com/office/powerpoint/2010/main" xmlns="" val="1191776143"/>
+        <p14:creationId xmlns="" xmlns:p14="http://schemas.microsoft.com/office/powerpoint/2010/main" val="1191776143"/>
       </p:ext>
     </p:extLst>
   </p:cSld>
@@ -3652,7 +3652,7 @@
     </p:spTree>
     <p:extLst>
       <p:ext uri="{BB962C8B-B14F-4D97-AF65-F5344CB8AC3E}">
-        <p14:creationId xmlns:p14="http://schemas.microsoft.com/office/powerpoint/2010/main" xmlns="" val="871637495"/>
+        <p14:creationId xmlns="" xmlns:p14="http://schemas.microsoft.com/office/powerpoint/2010/main" val="871637495"/>
       </p:ext>
     </p:extLst>
   </p:cSld>
@@ -3705,7 +3705,7 @@
     </p:spTree>
     <p:extLst>
       <p:ext uri="{BB962C8B-B14F-4D97-AF65-F5344CB8AC3E}">
-        <p14:creationId xmlns:p14="http://schemas.microsoft.com/office/powerpoint/2010/main" xmlns="" val="1191776143"/>
+        <p14:creationId xmlns="" xmlns:p14="http://schemas.microsoft.com/office/powerpoint/2010/main" val="1191776143"/>
       </p:ext>
     </p:extLst>
   </p:cSld>
@@ -3735,7 +3735,7 @@
     </p:spTree>
     <p:extLst>
       <p:ext uri="{BB962C8B-B14F-4D97-AF65-F5344CB8AC3E}">
-        <p14:creationId xmlns:p14="http://schemas.microsoft.com/office/powerpoint/2010/main" xmlns="" val="871637495"/>
+        <p14:creationId xmlns="" xmlns:p14="http://schemas.microsoft.com/office/powerpoint/2010/main" val="871637495"/>
       </p:ext>
     </p:extLst>
   </p:cSld>
@@ -3822,7 +3822,7 @@
     </p:spTree>
     <p:extLst>
       <p:ext uri="{BB962C8B-B14F-4D97-AF65-F5344CB8AC3E}">
-        <p14:creationId xmlns:p14="http://schemas.microsoft.com/office/powerpoint/2010/main" xmlns="" val="1724467125"/>
+        <p14:creationId xmlns="" xmlns:p14="http://schemas.microsoft.com/office/powerpoint/2010/main" val="1724467125"/>
       </p:ext>
     </p:extLst>
   </p:cSld>
@@ -4005,7 +4005,7 @@
     </p:spTree>
     <p:extLst>
       <p:ext uri="{BB962C8B-B14F-4D97-AF65-F5344CB8AC3E}">
-        <p14:creationId xmlns:p14="http://schemas.microsoft.com/office/powerpoint/2010/main" xmlns="" val="3825920509"/>
+        <p14:creationId xmlns="" xmlns:p14="http://schemas.microsoft.com/office/powerpoint/2010/main" val="3825920509"/>
       </p:ext>
     </p:extLst>
   </p:cSld>
@@ -4123,7 +4123,7 @@
     </p:spTree>
     <p:extLst>
       <p:ext uri="{BB962C8B-B14F-4D97-AF65-F5344CB8AC3E}">
-        <p14:creationId xmlns:p14="http://schemas.microsoft.com/office/powerpoint/2010/main" xmlns="" val="1473926903"/>
+        <p14:creationId xmlns="" xmlns:p14="http://schemas.microsoft.com/office/powerpoint/2010/main" val="1473926903"/>
       </p:ext>
     </p:extLst>
   </p:cSld>
@@ -4241,7 +4241,7 @@
     </p:spTree>
     <p:extLst>
       <p:ext uri="{BB962C8B-B14F-4D97-AF65-F5344CB8AC3E}">
-        <p14:creationId xmlns:p14="http://schemas.microsoft.com/office/powerpoint/2010/main" xmlns="" val="1681231856"/>
+        <p14:creationId xmlns="" xmlns:p14="http://schemas.microsoft.com/office/powerpoint/2010/main" val="1681231856"/>
       </p:ext>
     </p:extLst>
   </p:cSld>
@@ -4328,7 +4328,7 @@
     </p:spTree>
     <p:extLst>
       <p:ext uri="{BB962C8B-B14F-4D97-AF65-F5344CB8AC3E}">
-        <p14:creationId xmlns:p14="http://schemas.microsoft.com/office/powerpoint/2010/main" xmlns="" val="1724467125"/>
+        <p14:creationId xmlns="" xmlns:p14="http://schemas.microsoft.com/office/powerpoint/2010/main" val="1724467125"/>
       </p:ext>
     </p:extLst>
   </p:cSld>
@@ -4511,7 +4511,7 @@
     </p:spTree>
     <p:extLst>
       <p:ext uri="{BB962C8B-B14F-4D97-AF65-F5344CB8AC3E}">
-        <p14:creationId xmlns:p14="http://schemas.microsoft.com/office/powerpoint/2010/main" xmlns="" val="3825920509"/>
+        <p14:creationId xmlns="" xmlns:p14="http://schemas.microsoft.com/office/powerpoint/2010/main" val="3825920509"/>
       </p:ext>
     </p:extLst>
   </p:cSld>
@@ -4558,7 +4558,7 @@
           <a:blip r:embed="rId5" cstate="print">
             <a:extLst>
               <a:ext uri="{28A0092B-C50C-407E-A947-70E740481C1C}">
-                <a14:useLocalDpi xmlns:a14="http://schemas.microsoft.com/office/drawing/2010/main" xmlns="" val="0"/>
+                <a14:useLocalDpi xmlns="" xmlns:a14="http://schemas.microsoft.com/office/drawing/2010/main" val="0"/>
               </a:ext>
             </a:extLst>
           </a:blip>
@@ -4581,14 +4581,14 @@
           </a:ln>
           <a:extLst>
             <a:ext uri="{909E8E84-426E-40dd-AFC4-6F175D3DCCD1}">
-              <a14:hiddenFill xmlns:a14="http://schemas.microsoft.com/office/drawing/2010/main" xmlns="">
+              <a14:hiddenFill xmlns="" xmlns:a14="http://schemas.microsoft.com/office/drawing/2010/main">
                 <a:solidFill>
                   <a:srgbClr val="FFFFFF"/>
                 </a:solidFill>
               </a14:hiddenFill>
             </a:ext>
             <a:ext uri="{91240B29-F687-4f45-9708-019B960494DF}">
-              <a14:hiddenLine xmlns:a14="http://schemas.microsoft.com/office/drawing/2010/main" xmlns="" w="9525">
+              <a14:hiddenLine xmlns="" xmlns:a14="http://schemas.microsoft.com/office/drawing/2010/main" w="9525">
                 <a:solidFill>
                   <a:srgbClr val="000000"/>
                 </a:solidFill>
@@ -4666,14 +4666,14 @@
           </a:ln>
           <a:extLst>
             <a:ext uri="{909E8E84-426E-40dd-AFC4-6F175D3DCCD1}">
-              <a14:hiddenFill xmlns:a14="http://schemas.microsoft.com/office/drawing/2010/main" xmlns="">
+              <a14:hiddenFill xmlns="" xmlns:a14="http://schemas.microsoft.com/office/drawing/2010/main">
                 <a:solidFill>
                   <a:srgbClr val="FFFFFF"/>
                 </a:solidFill>
               </a14:hiddenFill>
             </a:ext>
             <a:ext uri="{91240B29-F687-4f45-9708-019B960494DF}">
-              <a14:hiddenLine xmlns:a14="http://schemas.microsoft.com/office/drawing/2010/main" xmlns="" w="9525">
+              <a14:hiddenLine xmlns="" xmlns:a14="http://schemas.microsoft.com/office/drawing/2010/main" w="9525">
                 <a:solidFill>
                   <a:srgbClr val="000000"/>
                 </a:solidFill>
@@ -4683,7 +4683,7 @@
               </a14:hiddenLine>
             </a:ext>
             <a:ext uri="{FAA26D3D-D897-4be2-8F04-BA451C77F1D7}">
-              <ma14:placeholderFlag xmlns:ma14="http://schemas.microsoft.com/office/mac/drawingml/2011/main" xmlns="" val="1"/>
+              <ma14:placeholderFlag xmlns="" xmlns:ma14="http://schemas.microsoft.com/office/mac/drawingml/2011/main" val="1"/>
             </a:ext>
           </a:extLst>
         </p:spPr>
@@ -4732,14 +4732,14 @@
           </a:ln>
           <a:extLst>
             <a:ext uri="{909E8E84-426E-40dd-AFC4-6F175D3DCCD1}">
-              <a14:hiddenFill xmlns:a14="http://schemas.microsoft.com/office/drawing/2010/main" xmlns="">
+              <a14:hiddenFill xmlns="" xmlns:a14="http://schemas.microsoft.com/office/drawing/2010/main">
                 <a:solidFill>
                   <a:srgbClr val="FFFFFF"/>
                 </a:solidFill>
               </a14:hiddenFill>
             </a:ext>
             <a:ext uri="{91240B29-F687-4f45-9708-019B960494DF}">
-              <a14:hiddenLine xmlns:a14="http://schemas.microsoft.com/office/drawing/2010/main" xmlns="" w="9525">
+              <a14:hiddenLine xmlns="" xmlns:a14="http://schemas.microsoft.com/office/drawing/2010/main" w="9525">
                 <a:solidFill>
                   <a:srgbClr val="000000"/>
                 </a:solidFill>
@@ -4749,7 +4749,7 @@
               </a14:hiddenLine>
             </a:ext>
             <a:ext uri="{FAA26D3D-D897-4be2-8F04-BA451C77F1D7}">
-              <ma14:placeholderFlag xmlns:ma14="http://schemas.microsoft.com/office/mac/drawingml/2011/main" xmlns="" val="1"/>
+              <ma14:placeholderFlag xmlns="" xmlns:ma14="http://schemas.microsoft.com/office/mac/drawingml/2011/main" val="1"/>
             </a:ext>
           </a:extLst>
         </p:spPr>
@@ -4793,7 +4793,7 @@
     </p:spTree>
     <p:extLst>
       <p:ext uri="{BB962C8B-B14F-4D97-AF65-F5344CB8AC3E}">
-        <p14:creationId xmlns:p14="http://schemas.microsoft.com/office/powerpoint/2010/main" xmlns="" val="4048614870"/>
+        <p14:creationId xmlns="" xmlns:p14="http://schemas.microsoft.com/office/powerpoint/2010/main" val="4048614870"/>
       </p:ext>
     </p:extLst>
   </p:cSld>
@@ -5244,14 +5244,14 @@
           <a:effectLst/>
           <a:extLst>
             <a:ext uri="{909E8E84-426E-40dd-AFC4-6F175D3DCCD1}">
-              <a14:hiddenFill xmlns:a14="http://schemas.microsoft.com/office/drawing/2010/main" xmlns="">
+              <a14:hiddenFill xmlns="" xmlns:a14="http://schemas.microsoft.com/office/drawing/2010/main">
                 <a:solidFill>
                   <a:schemeClr val="accent1"/>
                 </a:solidFill>
               </a14:hiddenFill>
             </a:ext>
             <a:ext uri="{91240B29-F687-4f45-9708-019B960494DF}">
-              <a14:hiddenLine xmlns:a14="http://schemas.microsoft.com/office/drawing/2010/main" xmlns="" w="9525">
+              <a14:hiddenLine xmlns="" xmlns:a14="http://schemas.microsoft.com/office/drawing/2010/main" w="9525">
                 <a:solidFill>
                   <a:srgbClr val="FF6600"/>
                 </a:solidFill>
@@ -5261,7 +5261,7 @@
               </a14:hiddenLine>
             </a:ext>
             <a:ext uri="{AF507438-7753-43e0-B8FC-AC1667EBCBE1}">
-              <a14:hiddenEffects xmlns:a14="http://schemas.microsoft.com/office/drawing/2010/main" xmlns="">
+              <a14:hiddenEffects xmlns="" xmlns:a14="http://schemas.microsoft.com/office/drawing/2010/main">
                 <a:effectLst>
                   <a:outerShdw blurRad="63500" dist="38099" dir="2700000" algn="ctr" rotWithShape="0">
                     <a:schemeClr val="bg2">
@@ -5817,7 +5817,7 @@
           <a:blip r:embed="rId5" cstate="print">
             <a:extLst>
               <a:ext uri="{28A0092B-C50C-407E-A947-70E740481C1C}">
-                <a14:useLocalDpi xmlns:a14="http://schemas.microsoft.com/office/drawing/2010/main" xmlns="" val="0"/>
+                <a14:useLocalDpi xmlns="" xmlns:a14="http://schemas.microsoft.com/office/drawing/2010/main" val="0"/>
               </a:ext>
             </a:extLst>
           </a:blip>
@@ -5840,14 +5840,14 @@
           </a:ln>
           <a:extLst>
             <a:ext uri="{909E8E84-426E-40dd-AFC4-6F175D3DCCD1}">
-              <a14:hiddenFill xmlns:a14="http://schemas.microsoft.com/office/drawing/2010/main" xmlns="">
+              <a14:hiddenFill xmlns="" xmlns:a14="http://schemas.microsoft.com/office/drawing/2010/main">
                 <a:solidFill>
                   <a:srgbClr val="FFFFFF"/>
                 </a:solidFill>
               </a14:hiddenFill>
             </a:ext>
             <a:ext uri="{91240B29-F687-4f45-9708-019B960494DF}">
-              <a14:hiddenLine xmlns:a14="http://schemas.microsoft.com/office/drawing/2010/main" xmlns="" w="9525">
+              <a14:hiddenLine xmlns="" xmlns:a14="http://schemas.microsoft.com/office/drawing/2010/main" w="9525">
                 <a:solidFill>
                   <a:srgbClr val="000000"/>
                 </a:solidFill>
@@ -5925,14 +5925,14 @@
           </a:ln>
           <a:extLst>
             <a:ext uri="{909E8E84-426E-40dd-AFC4-6F175D3DCCD1}">
-              <a14:hiddenFill xmlns:a14="http://schemas.microsoft.com/office/drawing/2010/main" xmlns="">
+              <a14:hiddenFill xmlns="" xmlns:a14="http://schemas.microsoft.com/office/drawing/2010/main">
                 <a:solidFill>
                   <a:srgbClr val="FFFFFF"/>
                 </a:solidFill>
               </a14:hiddenFill>
             </a:ext>
             <a:ext uri="{91240B29-F687-4f45-9708-019B960494DF}">
-              <a14:hiddenLine xmlns:a14="http://schemas.microsoft.com/office/drawing/2010/main" xmlns="" w="9525">
+              <a14:hiddenLine xmlns="" xmlns:a14="http://schemas.microsoft.com/office/drawing/2010/main" w="9525">
                 <a:solidFill>
                   <a:srgbClr val="000000"/>
                 </a:solidFill>
@@ -5942,7 +5942,7 @@
               </a14:hiddenLine>
             </a:ext>
             <a:ext uri="{FAA26D3D-D897-4be2-8F04-BA451C77F1D7}">
-              <ma14:placeholderFlag xmlns:ma14="http://schemas.microsoft.com/office/mac/drawingml/2011/main" xmlns="" val="1"/>
+              <ma14:placeholderFlag xmlns="" xmlns:ma14="http://schemas.microsoft.com/office/mac/drawingml/2011/main" val="1"/>
             </a:ext>
           </a:extLst>
         </p:spPr>
@@ -5991,14 +5991,14 @@
           </a:ln>
           <a:extLst>
             <a:ext uri="{909E8E84-426E-40dd-AFC4-6F175D3DCCD1}">
-              <a14:hiddenFill xmlns:a14="http://schemas.microsoft.com/office/drawing/2010/main" xmlns="">
+              <a14:hiddenFill xmlns="" xmlns:a14="http://schemas.microsoft.com/office/drawing/2010/main">
                 <a:solidFill>
                   <a:srgbClr val="FFFFFF"/>
                 </a:solidFill>
               </a14:hiddenFill>
             </a:ext>
             <a:ext uri="{91240B29-F687-4f45-9708-019B960494DF}">
-              <a14:hiddenLine xmlns:a14="http://schemas.microsoft.com/office/drawing/2010/main" xmlns="" w="9525">
+              <a14:hiddenLine xmlns="" xmlns:a14="http://schemas.microsoft.com/office/drawing/2010/main" w="9525">
                 <a:solidFill>
                   <a:srgbClr val="000000"/>
                 </a:solidFill>
@@ -6008,7 +6008,7 @@
               </a14:hiddenLine>
             </a:ext>
             <a:ext uri="{FAA26D3D-D897-4be2-8F04-BA451C77F1D7}">
-              <ma14:placeholderFlag xmlns:ma14="http://schemas.microsoft.com/office/mac/drawingml/2011/main" xmlns="" val="1"/>
+              <ma14:placeholderFlag xmlns="" xmlns:ma14="http://schemas.microsoft.com/office/mac/drawingml/2011/main" val="1"/>
             </a:ext>
           </a:extLst>
         </p:spPr>
@@ -6052,7 +6052,7 @@
     </p:spTree>
     <p:extLst>
       <p:ext uri="{BB962C8B-B14F-4D97-AF65-F5344CB8AC3E}">
-        <p14:creationId xmlns:p14="http://schemas.microsoft.com/office/powerpoint/2010/main" xmlns="" val="4048614870"/>
+        <p14:creationId xmlns="" xmlns:p14="http://schemas.microsoft.com/office/powerpoint/2010/main" val="4048614870"/>
       </p:ext>
     </p:extLst>
   </p:cSld>
@@ -6738,7 +6738,7 @@
           <a:blip r:embed="rId3" cstate="print">
             <a:extLst>
               <a:ext uri="{28A0092B-C50C-407E-A947-70E740481C1C}">
-                <a14:useLocalDpi xmlns:a14="http://schemas.microsoft.com/office/drawing/2010/main" xmlns="" val="0"/>
+                <a14:useLocalDpi xmlns="" xmlns:a14="http://schemas.microsoft.com/office/drawing/2010/main" val="0"/>
               </a:ext>
             </a:extLst>
           </a:blip>
@@ -6759,7 +6759,7 @@
     </p:spTree>
     <p:extLst>
       <p:ext uri="{BB962C8B-B14F-4D97-AF65-F5344CB8AC3E}">
-        <p14:creationId xmlns:p14="http://schemas.microsoft.com/office/powerpoint/2010/main" xmlns="" val="2572022632"/>
+        <p14:creationId xmlns="" xmlns:p14="http://schemas.microsoft.com/office/powerpoint/2010/main" val="2572022632"/>
       </p:ext>
     </p:extLst>
   </p:cSld>
@@ -6767,7 +6767,7 @@
     <a:masterClrMapping/>
   </p:clrMapOvr>
   <mc:AlternateContent xmlns:mc="http://schemas.openxmlformats.org/markup-compatibility/2006">
-    <mc:Choice xmlns:p14="http://schemas.microsoft.com/office/powerpoint/2010/main" xmlns="" Requires="p14">
+    <mc:Choice xmlns="" xmlns:p14="http://schemas.microsoft.com/office/powerpoint/2010/main" Requires="p14">
       <p:transition spd="slow" p14:dur="2000" advTm="19458"/>
     </mc:Choice>
     <mc:Fallback>
@@ -6895,23 +6895,7 @@
                   <a:schemeClr val="tx1"/>
                 </a:solidFill>
               </a:rPr>
-              <a:t>Visione </a:t>
-            </a:r>
-            <a:r>
-              <a:rPr lang="it-IT" sz="2000" dirty="0" smtClean="0">
-                <a:solidFill>
-                  <a:schemeClr val="tx1"/>
-                </a:solidFill>
-              </a:rPr>
-              <a:t>locale della </a:t>
-            </a:r>
-            <a:r>
-              <a:rPr lang="it-IT" sz="2000" dirty="0" smtClean="0">
-                <a:solidFill>
-                  <a:schemeClr val="tx1"/>
-                </a:solidFill>
-              </a:rPr>
-              <a:t>rete</a:t>
+              <a:t>Visione locale della rete</a:t>
             </a:r>
           </a:p>
           <a:p>
@@ -6927,11 +6911,6 @@
               </a:rPr>
               <a:t>Rete Peer-to-Peer</a:t>
             </a:r>
-            <a:endParaRPr lang="it-IT" sz="2000" dirty="0" smtClean="0">
-              <a:solidFill>
-                <a:schemeClr val="tx1"/>
-              </a:solidFill>
-            </a:endParaRPr>
           </a:p>
         </p:txBody>
       </p:sp>
@@ -7138,10 +7117,10 @@
                 <a:ea typeface="ＭＳ Ｐゴシック" charset="0"/>
                 <a:cs typeface="+mn-cs"/>
               </a:rPr>
-              <a:t>Controlli </a:t>
-            </a:r>
-            <a:r>
-              <a:rPr kumimoji="0" lang="it-IT" sz="2000" b="0" i="0" u="none" strike="noStrike" kern="1200" cap="none" spc="0" normalizeH="0" baseline="0" noProof="0" dirty="0" smtClean="0">
+              <a:t>Controlli e sicurezza</a:t>
+            </a:r>
+            <a:r>
+              <a:rPr kumimoji="0" lang="it-IT" sz="2000" b="0" i="0" u="none" strike="noStrike" kern="1200" cap="none" spc="0" normalizeH="0" noProof="0" dirty="0" smtClean="0">
                 <a:ln>
                   <a:noFill/>
                 </a:ln>
@@ -7155,10 +7134,10 @@
                 <a:ea typeface="ＭＳ Ｐゴシック" charset="0"/>
                 <a:cs typeface="+mn-cs"/>
               </a:rPr>
-              <a:t>e sicurezza</a:t>
-            </a:r>
-            <a:r>
-              <a:rPr kumimoji="0" lang="it-IT" sz="2000" b="0" i="0" u="none" strike="noStrike" kern="1200" cap="none" spc="0" normalizeH="0" noProof="0" dirty="0" smtClean="0">
+              <a:t> </a:t>
+            </a:r>
+            <a:r>
+              <a:rPr kumimoji="0" lang="it-IT" sz="2000" b="0" i="0" u="none" strike="noStrike" kern="1200" cap="none" spc="0" normalizeH="0" baseline="0" noProof="0" dirty="0" smtClean="0">
                 <a:ln>
                   <a:noFill/>
                 </a:ln>
@@ -7172,39 +7151,8 @@
                 <a:ea typeface="ＭＳ Ｐゴシック" charset="0"/>
                 <a:cs typeface="+mn-cs"/>
               </a:rPr>
-              <a:t> </a:t>
-            </a:r>
-            <a:r>
-              <a:rPr kumimoji="0" lang="it-IT" sz="2000" b="0" i="0" u="none" strike="noStrike" kern="1200" cap="none" spc="0" normalizeH="0" baseline="0" noProof="0" dirty="0" smtClean="0">
-                <a:ln>
-                  <a:noFill/>
-                </a:ln>
-                <a:solidFill>
-                  <a:schemeClr val="tx1"/>
-                </a:solidFill>
-                <a:effectLst/>
-                <a:uLnTx/>
-                <a:uFillTx/>
-                <a:latin typeface="+mn-lt"/>
-                <a:ea typeface="ＭＳ Ｐゴシック" charset="0"/>
-                <a:cs typeface="+mn-cs"/>
-              </a:rPr>
               <a:t>centralizzati</a:t>
             </a:r>
-            <a:endParaRPr kumimoji="0" lang="it-IT" sz="2000" b="0" i="0" u="none" strike="noStrike" kern="1200" cap="none" spc="0" normalizeH="0" baseline="0" noProof="0" dirty="0" smtClean="0">
-              <a:ln>
-                <a:noFill/>
-              </a:ln>
-              <a:solidFill>
-                <a:schemeClr val="tx1"/>
-              </a:solidFill>
-              <a:effectLst/>
-              <a:uLnTx/>
-              <a:uFillTx/>
-              <a:latin typeface="+mn-lt"/>
-              <a:ea typeface="ＭＳ Ｐゴシック" charset="0"/>
-              <a:cs typeface="+mn-cs"/>
-            </a:endParaRPr>
           </a:p>
           <a:p>
             <a:pPr marL="342900" marR="0" lvl="0" indent="-342900" algn="l" defTabSz="914400" rtl="0" eaLnBrk="1" fontAlgn="base" latinLnBrk="0" hangingPunct="1">
@@ -7398,7 +7346,7 @@
     </p:custDataLst>
     <p:extLst>
       <p:ext uri="{BB962C8B-B14F-4D97-AF65-F5344CB8AC3E}">
-        <p14:creationId xmlns:p14="http://schemas.microsoft.com/office/powerpoint/2010/main" xmlns="" val="2671343476"/>
+        <p14:creationId xmlns="" xmlns:p14="http://schemas.microsoft.com/office/powerpoint/2010/main" val="2671343476"/>
       </p:ext>
     </p:extLst>
   </p:cSld>
@@ -7406,7 +7354,7 @@
     <a:masterClrMapping/>
   </p:clrMapOvr>
   <mc:AlternateContent xmlns:mc="http://schemas.openxmlformats.org/markup-compatibility/2006">
-    <mc:Choice xmlns:p14="http://schemas.microsoft.com/office/powerpoint/2010/main" xmlns="" Requires="p14">
+    <mc:Choice xmlns="" xmlns:p14="http://schemas.microsoft.com/office/powerpoint/2010/main" Requires="p14">
       <p:transition spd="slow" p14:dur="2000" advTm="157969"/>
     </mc:Choice>
     <mc:Fallback>
@@ -7785,7 +7733,7 @@
     </p:custDataLst>
     <p:extLst>
       <p:ext uri="{BB962C8B-B14F-4D97-AF65-F5344CB8AC3E}">
-        <p14:creationId xmlns:p14="http://schemas.microsoft.com/office/powerpoint/2010/main" xmlns="" val="2671343476"/>
+        <p14:creationId xmlns="" xmlns:p14="http://schemas.microsoft.com/office/powerpoint/2010/main" val="2671343476"/>
       </p:ext>
     </p:extLst>
   </p:cSld>
@@ -7793,7 +7741,7 @@
     <a:masterClrMapping/>
   </p:clrMapOvr>
   <mc:AlternateContent xmlns:mc="http://schemas.openxmlformats.org/markup-compatibility/2006">
-    <mc:Choice xmlns:p14="http://schemas.microsoft.com/office/powerpoint/2010/main" xmlns="" Requires="p14">
+    <mc:Choice xmlns="" xmlns:p14="http://schemas.microsoft.com/office/powerpoint/2010/main" Requires="p14">
       <p:transition spd="slow" p14:dur="2000" advTm="157969"/>
     </mc:Choice>
     <mc:Fallback>
@@ -7993,13 +7941,6 @@
               </a:rPr>
               <a:t>Soluzione</a:t>
             </a:r>
-            <a:endParaRPr lang="it-IT" sz="2400" dirty="0" smtClean="0">
-              <a:solidFill>
-                <a:schemeClr val="bg1">
-                  <a:lumMod val="50000"/>
-                </a:schemeClr>
-              </a:solidFill>
-            </a:endParaRPr>
           </a:p>
           <a:p>
             <a:pPr marL="457200" indent="-457200">
@@ -8051,7 +7992,7 @@
     </p:spTree>
     <p:extLst>
       <p:ext uri="{BB962C8B-B14F-4D97-AF65-F5344CB8AC3E}">
-        <p14:creationId xmlns:p14="http://schemas.microsoft.com/office/powerpoint/2010/main" xmlns="" val="4293126687"/>
+        <p14:creationId xmlns="" xmlns:p14="http://schemas.microsoft.com/office/powerpoint/2010/main" val="4293126687"/>
       </p:ext>
     </p:extLst>
   </p:cSld>
@@ -8059,7 +8000,7 @@
     <a:masterClrMapping/>
   </p:clrMapOvr>
   <mc:AlternateContent xmlns:mc="http://schemas.openxmlformats.org/markup-compatibility/2006">
-    <mc:Choice xmlns:p14="http://schemas.microsoft.com/office/powerpoint/2010/main" xmlns="" Requires="p14">
+    <mc:Choice xmlns="" xmlns:p14="http://schemas.microsoft.com/office/powerpoint/2010/main" Requires="p14">
       <p:transition spd="slow" p14:dur="2000" advTm="25932"/>
     </mc:Choice>
     <mc:Fallback>
@@ -8112,7 +8053,6 @@
               <a:rPr lang="it-IT" dirty="0" smtClean="0"/>
               <a:t>Gossip - introduzione</a:t>
             </a:r>
-            <a:endParaRPr lang="it-IT" dirty="0" smtClean="0"/>
           </a:p>
         </p:txBody>
       </p:sp>
@@ -8168,39 +8108,7 @@
                   <a:schemeClr val="tx1"/>
                 </a:solidFill>
               </a:rPr>
-              <a:t>Modelli adatti per </a:t>
-            </a:r>
-            <a:r>
-              <a:rPr lang="it-IT" sz="2400" dirty="0" smtClean="0">
-                <a:solidFill>
-                  <a:schemeClr val="tx1"/>
-                </a:solidFill>
-              </a:rPr>
-              <a:t>lo studio della diffusione </a:t>
-            </a:r>
-            <a:r>
-              <a:rPr lang="it-IT" sz="2400" dirty="0" smtClean="0">
-                <a:solidFill>
-                  <a:schemeClr val="tx1"/>
-                </a:solidFill>
-              </a:rPr>
-              <a:t>di epidemie e </a:t>
-            </a:r>
-            <a:r>
-              <a:rPr lang="it-IT" sz="2400" dirty="0" smtClean="0">
-                <a:solidFill>
-                  <a:schemeClr val="tx1"/>
-                </a:solidFill>
-              </a:rPr>
-              <a:t>della diffusione di </a:t>
-            </a:r>
-            <a:r>
-              <a:rPr lang="it-IT" sz="2400" dirty="0" smtClean="0">
-                <a:solidFill>
-                  <a:schemeClr val="tx1"/>
-                </a:solidFill>
-              </a:rPr>
-              <a:t>informazioni (</a:t>
+              <a:t>Modelli adatti per lo studio della diffusione di epidemie e della diffusione di informazioni (</a:t>
             </a:r>
             <a:r>
               <a:rPr lang="it-IT" sz="2200" dirty="0" smtClean="0">
@@ -8216,23 +8124,7 @@
                   <a:schemeClr val="tx1"/>
                 </a:solidFill>
               </a:rPr>
-              <a:t>Epidemic </a:t>
-            </a:r>
-            <a:r>
-              <a:rPr lang="en-US" sz="2200" i="1" dirty="0" smtClean="0">
-                <a:solidFill>
-                  <a:schemeClr val="tx1"/>
-                </a:solidFill>
-              </a:rPr>
-              <a:t>algorithms for replicated database </a:t>
-            </a:r>
-            <a:r>
-              <a:rPr lang="en-US" sz="2200" i="1" dirty="0" smtClean="0">
-                <a:solidFill>
-                  <a:schemeClr val="tx1"/>
-                </a:solidFill>
-              </a:rPr>
-              <a:t>maintenance”, Xerox Research Center, 1987</a:t>
+              <a:t>Epidemic algorithms for replicated database maintenance”, Xerox Research Center, 1987</a:t>
             </a:r>
             <a:r>
               <a:rPr lang="it-IT" sz="2400" dirty="0" smtClean="0">
@@ -8330,15 +8222,7 @@
                   <a:schemeClr val="tx1"/>
                 </a:solidFill>
               </a:rPr>
-              <a:t> System</a:t>
-            </a:r>
-            <a:r>
-              <a:rPr lang="it-IT" sz="2000" dirty="0" smtClean="0">
-                <a:solidFill>
-                  <a:schemeClr val="tx1"/>
-                </a:solidFill>
-              </a:rPr>
-              <a:t>)</a:t>
+              <a:t> System)</a:t>
             </a:r>
           </a:p>
           <a:p>
@@ -8405,7 +8289,7 @@
     </p:custDataLst>
     <p:extLst>
       <p:ext uri="{BB962C8B-B14F-4D97-AF65-F5344CB8AC3E}">
-        <p14:creationId xmlns:p14="http://schemas.microsoft.com/office/powerpoint/2010/main" xmlns="" val="2671343476"/>
+        <p14:creationId xmlns="" xmlns:p14="http://schemas.microsoft.com/office/powerpoint/2010/main" val="2671343476"/>
       </p:ext>
     </p:extLst>
   </p:cSld>
@@ -8413,7 +8297,7 @@
     <a:masterClrMapping/>
   </p:clrMapOvr>
   <mc:AlternateContent xmlns:mc="http://schemas.openxmlformats.org/markup-compatibility/2006">
-    <mc:Choice xmlns:p14="http://schemas.microsoft.com/office/powerpoint/2010/main" xmlns="" Requires="p14">
+    <mc:Choice xmlns="" xmlns:p14="http://schemas.microsoft.com/office/powerpoint/2010/main" Requires="p14">
       <p:transition spd="slow" p14:dur="2000" advTm="157969"/>
     </mc:Choice>
     <mc:Fallback>
@@ -8497,11 +8381,6 @@
               </a:rPr>
               <a:t>Stati epidemici:</a:t>
             </a:r>
-            <a:endParaRPr lang="it-IT" sz="2400" dirty="0" smtClean="0">
-              <a:solidFill>
-                <a:schemeClr val="tx1"/>
-              </a:solidFill>
-            </a:endParaRPr>
           </a:p>
           <a:p>
             <a:pPr>
@@ -9643,7 +9522,7 @@
     </p:custDataLst>
     <p:extLst>
       <p:ext uri="{BB962C8B-B14F-4D97-AF65-F5344CB8AC3E}">
-        <p14:creationId xmlns:p14="http://schemas.microsoft.com/office/powerpoint/2010/main" xmlns="" val="2671343476"/>
+        <p14:creationId xmlns="" xmlns:p14="http://schemas.microsoft.com/office/powerpoint/2010/main" val="2671343476"/>
       </p:ext>
     </p:extLst>
   </p:cSld>
@@ -9651,7 +9530,7 @@
     <a:masterClrMapping/>
   </p:clrMapOvr>
   <mc:AlternateContent xmlns:mc="http://schemas.openxmlformats.org/markup-compatibility/2006">
-    <mc:Choice xmlns:p14="http://schemas.microsoft.com/office/powerpoint/2010/main" xmlns="" Requires="p14">
+    <mc:Choice xmlns="" xmlns:p14="http://schemas.microsoft.com/office/powerpoint/2010/main" Requires="p14">
       <p:transition spd="slow" p14:dur="2000" advTm="157969"/>
     </mc:Choice>
     <mc:Fallback>
@@ -9941,11 +9820,6 @@
               </a:rPr>
               <a:t>Si conosce a priori il numero di trasmissioni che verranno effettuate</a:t>
             </a:r>
-            <a:endParaRPr lang="it-IT" sz="2400" dirty="0" smtClean="0">
-              <a:solidFill>
-                <a:schemeClr val="tx1"/>
-              </a:solidFill>
-            </a:endParaRPr>
           </a:p>
         </p:txBody>
       </p:sp>
@@ -9955,7 +9829,7 @@
     </p:custDataLst>
     <p:extLst>
       <p:ext uri="{BB962C8B-B14F-4D97-AF65-F5344CB8AC3E}">
-        <p14:creationId xmlns:p14="http://schemas.microsoft.com/office/powerpoint/2010/main" xmlns="" val="2671343476"/>
+        <p14:creationId xmlns="" xmlns:p14="http://schemas.microsoft.com/office/powerpoint/2010/main" val="2671343476"/>
       </p:ext>
     </p:extLst>
   </p:cSld>
@@ -9963,7 +9837,7 @@
     <a:masterClrMapping/>
   </p:clrMapOvr>
   <mc:AlternateContent xmlns:mc="http://schemas.openxmlformats.org/markup-compatibility/2006">
-    <mc:Choice xmlns:p14="http://schemas.microsoft.com/office/powerpoint/2010/main" xmlns="" Requires="p14">
+    <mc:Choice xmlns="" xmlns:p14="http://schemas.microsoft.com/office/powerpoint/2010/main" Requires="p14">
       <p:transition spd="slow" p14:dur="2000" advTm="157969"/>
     </mc:Choice>
     <mc:Fallback>
@@ -10112,13 +9986,6 @@
               </a:rPr>
               <a:t>Soluzione</a:t>
             </a:r>
-            <a:endParaRPr lang="it-IT" sz="2800" dirty="0" smtClean="0">
-              <a:solidFill>
-                <a:schemeClr val="bg1">
-                  <a:lumMod val="50000"/>
-                </a:schemeClr>
-              </a:solidFill>
-            </a:endParaRPr>
           </a:p>
           <a:p>
             <a:pPr marL="457200" indent="-457200">
@@ -10170,7 +10037,7 @@
     </p:spTree>
     <p:extLst>
       <p:ext uri="{BB962C8B-B14F-4D97-AF65-F5344CB8AC3E}">
-        <p14:creationId xmlns:p14="http://schemas.microsoft.com/office/powerpoint/2010/main" xmlns="" val="4293126687"/>
+        <p14:creationId xmlns="" xmlns:p14="http://schemas.microsoft.com/office/powerpoint/2010/main" val="4293126687"/>
       </p:ext>
     </p:extLst>
   </p:cSld>
@@ -10178,7 +10045,7 @@
     <a:masterClrMapping/>
   </p:clrMapOvr>
   <mc:AlternateContent xmlns:mc="http://schemas.openxmlformats.org/markup-compatibility/2006">
-    <mc:Choice xmlns:p14="http://schemas.microsoft.com/office/powerpoint/2010/main" xmlns="" Requires="p14">
+    <mc:Choice xmlns="" xmlns:p14="http://schemas.microsoft.com/office/powerpoint/2010/main" Requires="p14">
       <p:transition spd="slow" p14:dur="2000" advTm="25932"/>
     </mc:Choice>
     <mc:Fallback>
@@ -10231,7 +10098,6 @@
               <a:rPr lang="it-IT" dirty="0" smtClean="0"/>
               <a:t>Analisi di fattibilità – studio energetico</a:t>
             </a:r>
-            <a:endParaRPr lang="it-IT" dirty="0" smtClean="0"/>
           </a:p>
         </p:txBody>
       </p:sp>
@@ -10267,7 +10133,7 @@
     </p:custDataLst>
     <p:extLst>
       <p:ext uri="{BB962C8B-B14F-4D97-AF65-F5344CB8AC3E}">
-        <p14:creationId xmlns:p14="http://schemas.microsoft.com/office/powerpoint/2010/main" xmlns="" val="2671343476"/>
+        <p14:creationId xmlns="" xmlns:p14="http://schemas.microsoft.com/office/powerpoint/2010/main" val="2671343476"/>
       </p:ext>
     </p:extLst>
   </p:cSld>
@@ -10275,7 +10141,7 @@
     <a:masterClrMapping/>
   </p:clrMapOvr>
   <mc:AlternateContent xmlns:mc="http://schemas.openxmlformats.org/markup-compatibility/2006">
-    <mc:Choice xmlns:p14="http://schemas.microsoft.com/office/powerpoint/2010/main" xmlns="" Requires="p14">
+    <mc:Choice xmlns="" xmlns:p14="http://schemas.microsoft.com/office/powerpoint/2010/main" Requires="p14">
       <p:transition spd="slow" p14:dur="2000" advTm="157969"/>
     </mc:Choice>
     <mc:Fallback>
@@ -10328,7 +10194,6 @@
               <a:rPr lang="it-IT" dirty="0" smtClean="0"/>
               <a:t>Analisi di fattibilità – studio energetico</a:t>
             </a:r>
-            <a:endParaRPr lang="it-IT" dirty="0" smtClean="0"/>
           </a:p>
         </p:txBody>
       </p:sp>
@@ -10449,7 +10314,7 @@
     </p:custDataLst>
     <p:extLst>
       <p:ext uri="{BB962C8B-B14F-4D97-AF65-F5344CB8AC3E}">
-        <p14:creationId xmlns:p14="http://schemas.microsoft.com/office/powerpoint/2010/main" xmlns="" val="2671343476"/>
+        <p14:creationId xmlns="" xmlns:p14="http://schemas.microsoft.com/office/powerpoint/2010/main" val="2671343476"/>
       </p:ext>
     </p:extLst>
   </p:cSld>
@@ -10457,7 +10322,7 @@
     <a:masterClrMapping/>
   </p:clrMapOvr>
   <mc:AlternateContent xmlns:mc="http://schemas.openxmlformats.org/markup-compatibility/2006">
-    <mc:Choice xmlns:p14="http://schemas.microsoft.com/office/powerpoint/2010/main" xmlns="" Requires="p14">
+    <mc:Choice xmlns="" xmlns:p14="http://schemas.microsoft.com/office/powerpoint/2010/main" Requires="p14">
       <p:transition spd="slow" p14:dur="2000" advTm="157969"/>
     </mc:Choice>
     <mc:Fallback>
@@ -10604,21 +10469,8 @@
                   <a:srgbClr val="0070C0"/>
                 </a:solidFill>
               </a:rPr>
-              <a:t>So</a:t>
-            </a:r>
-            <a:r>
-              <a:rPr lang="it-IT" sz="2800" b="1" dirty="0" smtClean="0">
-                <a:solidFill>
-                  <a:srgbClr val="0070C0"/>
-                </a:solidFill>
-              </a:rPr>
-              <a:t>luzione</a:t>
-            </a:r>
-            <a:endParaRPr lang="it-IT" sz="2800" b="1" dirty="0" smtClean="0">
-              <a:solidFill>
-                <a:srgbClr val="0070C0"/>
-              </a:solidFill>
-            </a:endParaRPr>
+              <a:t>Soluzione</a:t>
+            </a:r>
           </a:p>
           <a:p>
             <a:pPr marL="457200" indent="-457200">
@@ -10670,7 +10522,7 @@
     </p:spTree>
     <p:extLst>
       <p:ext uri="{BB962C8B-B14F-4D97-AF65-F5344CB8AC3E}">
-        <p14:creationId xmlns:p14="http://schemas.microsoft.com/office/powerpoint/2010/main" xmlns="" val="4293126687"/>
+        <p14:creationId xmlns="" xmlns:p14="http://schemas.microsoft.com/office/powerpoint/2010/main" val="4293126687"/>
       </p:ext>
     </p:extLst>
   </p:cSld>
@@ -10678,7 +10530,7 @@
     <a:masterClrMapping/>
   </p:clrMapOvr>
   <mc:AlternateContent xmlns:mc="http://schemas.openxmlformats.org/markup-compatibility/2006">
-    <mc:Choice xmlns:p14="http://schemas.microsoft.com/office/powerpoint/2010/main" xmlns="" Requires="p14">
+    <mc:Choice xmlns="" xmlns:p14="http://schemas.microsoft.com/office/powerpoint/2010/main" Requires="p14">
       <p:transition spd="slow" p14:dur="2000" advTm="25932"/>
     </mc:Choice>
     <mc:Fallback>
@@ -10866,7 +10718,7 @@
     </p:spTree>
     <p:extLst>
       <p:ext uri="{BB962C8B-B14F-4D97-AF65-F5344CB8AC3E}">
-        <p14:creationId xmlns:p14="http://schemas.microsoft.com/office/powerpoint/2010/main" xmlns="" val="4293126687"/>
+        <p14:creationId xmlns="" xmlns:p14="http://schemas.microsoft.com/office/powerpoint/2010/main" val="4293126687"/>
       </p:ext>
     </p:extLst>
   </p:cSld>
@@ -10874,7 +10726,7 @@
     <a:masterClrMapping/>
   </p:clrMapOvr>
   <mc:AlternateContent xmlns:mc="http://schemas.openxmlformats.org/markup-compatibility/2006">
-    <mc:Choice xmlns:p14="http://schemas.microsoft.com/office/powerpoint/2010/main" xmlns="" Requires="p14">
+    <mc:Choice xmlns="" xmlns:p14="http://schemas.microsoft.com/office/powerpoint/2010/main" Requires="p14">
       <p:transition spd="slow" p14:dur="2000" advTm="25932"/>
     </mc:Choice>
     <mc:Fallback>
@@ -10927,7 +10779,6 @@
               <a:rPr lang="it-IT" dirty="0" smtClean="0"/>
               <a:t>Soluzione – progettazione logica</a:t>
             </a:r>
-            <a:endParaRPr lang="it-IT" dirty="0" smtClean="0"/>
           </a:p>
         </p:txBody>
       </p:sp>
@@ -11007,7 +10858,7 @@
     </p:custDataLst>
     <p:extLst>
       <p:ext uri="{BB962C8B-B14F-4D97-AF65-F5344CB8AC3E}">
-        <p14:creationId xmlns:p14="http://schemas.microsoft.com/office/powerpoint/2010/main" xmlns="" val="2671343476"/>
+        <p14:creationId xmlns="" xmlns:p14="http://schemas.microsoft.com/office/powerpoint/2010/main" val="2671343476"/>
       </p:ext>
     </p:extLst>
   </p:cSld>
@@ -11015,7 +10866,7 @@
     <a:masterClrMapping/>
   </p:clrMapOvr>
   <mc:AlternateContent xmlns:mc="http://schemas.openxmlformats.org/markup-compatibility/2006">
-    <mc:Choice xmlns:p14="http://schemas.microsoft.com/office/powerpoint/2010/main" xmlns="" Requires="p14">
+    <mc:Choice xmlns="" xmlns:p14="http://schemas.microsoft.com/office/powerpoint/2010/main" Requires="p14">
       <p:transition spd="slow" p14:dur="2000" advTm="157969"/>
     </mc:Choice>
     <mc:Fallback>
@@ -11166,13 +11017,6 @@
               </a:rPr>
               <a:t>Soluzione</a:t>
             </a:r>
-            <a:endParaRPr lang="it-IT" sz="2800" dirty="0" smtClean="0">
-              <a:solidFill>
-                <a:schemeClr val="bg1">
-                  <a:lumMod val="50000"/>
-                </a:schemeClr>
-              </a:solidFill>
-            </a:endParaRPr>
           </a:p>
           <a:p>
             <a:pPr marL="457200" indent="-457200">
@@ -11222,7 +11066,7 @@
     </p:spTree>
     <p:extLst>
       <p:ext uri="{BB962C8B-B14F-4D97-AF65-F5344CB8AC3E}">
-        <p14:creationId xmlns:p14="http://schemas.microsoft.com/office/powerpoint/2010/main" xmlns="" val="4293126687"/>
+        <p14:creationId xmlns="" xmlns:p14="http://schemas.microsoft.com/office/powerpoint/2010/main" val="4293126687"/>
       </p:ext>
     </p:extLst>
   </p:cSld>
@@ -11230,7 +11074,7 @@
     <a:masterClrMapping/>
   </p:clrMapOvr>
   <mc:AlternateContent xmlns:mc="http://schemas.openxmlformats.org/markup-compatibility/2006">
-    <mc:Choice xmlns:p14="http://schemas.microsoft.com/office/powerpoint/2010/main" xmlns="" Requires="p14">
+    <mc:Choice xmlns="" xmlns:p14="http://schemas.microsoft.com/office/powerpoint/2010/main" Requires="p14">
       <p:transition spd="slow" p14:dur="2000" advTm="25932"/>
     </mc:Choice>
     <mc:Fallback>
@@ -11381,13 +11225,6 @@
               </a:rPr>
               <a:t>Soluzione</a:t>
             </a:r>
-            <a:endParaRPr lang="it-IT" sz="2800" dirty="0" smtClean="0">
-              <a:solidFill>
-                <a:schemeClr val="bg1">
-                  <a:lumMod val="50000"/>
-                </a:schemeClr>
-              </a:solidFill>
-            </a:endParaRPr>
           </a:p>
           <a:p>
             <a:pPr marL="457200" indent="-457200">
@@ -11435,7 +11272,7 @@
     </p:spTree>
     <p:extLst>
       <p:ext uri="{BB962C8B-B14F-4D97-AF65-F5344CB8AC3E}">
-        <p14:creationId xmlns:p14="http://schemas.microsoft.com/office/powerpoint/2010/main" xmlns="" val="4293126687"/>
+        <p14:creationId xmlns="" xmlns:p14="http://schemas.microsoft.com/office/powerpoint/2010/main" val="4293126687"/>
       </p:ext>
     </p:extLst>
   </p:cSld>
@@ -11443,7 +11280,7 @@
     <a:masterClrMapping/>
   </p:clrMapOvr>
   <mc:AlternateContent xmlns:mc="http://schemas.openxmlformats.org/markup-compatibility/2006">
-    <mc:Choice xmlns:p14="http://schemas.microsoft.com/office/powerpoint/2010/main" xmlns="" Requires="p14">
+    <mc:Choice xmlns="" xmlns:p14="http://schemas.microsoft.com/office/powerpoint/2010/main" Requires="p14">
       <p:transition spd="slow" p14:dur="2000" advTm="25932"/>
     </mc:Choice>
     <mc:Fallback>
@@ -11525,7 +11362,7 @@
     </p:custDataLst>
     <p:extLst>
       <p:ext uri="{BB962C8B-B14F-4D97-AF65-F5344CB8AC3E}">
-        <p14:creationId xmlns:p14="http://schemas.microsoft.com/office/powerpoint/2010/main" xmlns="" val="1562047360"/>
+        <p14:creationId xmlns="" xmlns:p14="http://schemas.microsoft.com/office/powerpoint/2010/main" val="1562047360"/>
       </p:ext>
     </p:extLst>
   </p:cSld>
@@ -11533,7 +11370,7 @@
     <a:masterClrMapping/>
   </p:clrMapOvr>
   <mc:AlternateContent xmlns:mc="http://schemas.openxmlformats.org/markup-compatibility/2006">
-    <mc:Choice xmlns:p14="http://schemas.microsoft.com/office/powerpoint/2010/main" xmlns="" Requires="p14">
+    <mc:Choice xmlns="" xmlns:p14="http://schemas.microsoft.com/office/powerpoint/2010/main" Requires="p14">
       <p:transition spd="slow" p14:dur="2000" advTm="9545"/>
     </mc:Choice>
     <mc:Fallback>
@@ -11579,7 +11416,7 @@
           <a:blip r:embed="rId2" cstate="print">
             <a:extLst>
               <a:ext uri="{28A0092B-C50C-407E-A947-70E740481C1C}">
-                <a14:useLocalDpi xmlns:a14="http://schemas.microsoft.com/office/drawing/2010/main" xmlns="" val="0"/>
+                <a14:useLocalDpi xmlns="" xmlns:a14="http://schemas.microsoft.com/office/drawing/2010/main" val="0"/>
               </a:ext>
             </a:extLst>
           </a:blip>
@@ -11654,7 +11491,7 @@
     </p:spTree>
     <p:extLst>
       <p:ext uri="{BB962C8B-B14F-4D97-AF65-F5344CB8AC3E}">
-        <p14:creationId xmlns:p14="http://schemas.microsoft.com/office/powerpoint/2010/main" xmlns="" val="1982816369"/>
+        <p14:creationId xmlns="" xmlns:p14="http://schemas.microsoft.com/office/powerpoint/2010/main" val="1982816369"/>
       </p:ext>
     </p:extLst>
   </p:cSld>
@@ -11662,7 +11499,7 @@
     <a:masterClrMapping/>
   </p:clrMapOvr>
   <mc:AlternateContent xmlns:mc="http://schemas.openxmlformats.org/markup-compatibility/2006">
-    <mc:Choice xmlns:p14="http://schemas.microsoft.com/office/powerpoint/2010/main" xmlns="" Requires="p14">
+    <mc:Choice xmlns="" xmlns:p14="http://schemas.microsoft.com/office/powerpoint/2010/main" Requires="p14">
       <p:transition spd="slow" p14:dur="2000" advTm="5275"/>
     </mc:Choice>
     <mc:Fallback>
@@ -11811,13 +11648,6 @@
               </a:rPr>
               <a:t>Soluzione</a:t>
             </a:r>
-            <a:endParaRPr lang="it-IT" sz="2800" dirty="0" smtClean="0">
-              <a:solidFill>
-                <a:schemeClr val="bg1">
-                  <a:lumMod val="50000"/>
-                </a:schemeClr>
-              </a:solidFill>
-            </a:endParaRPr>
           </a:p>
           <a:p>
             <a:pPr marL="457200" indent="-457200">
@@ -11869,7 +11699,7 @@
     </p:spTree>
     <p:extLst>
       <p:ext uri="{BB962C8B-B14F-4D97-AF65-F5344CB8AC3E}">
-        <p14:creationId xmlns:p14="http://schemas.microsoft.com/office/powerpoint/2010/main" xmlns="" val="4293126687"/>
+        <p14:creationId xmlns="" xmlns:p14="http://schemas.microsoft.com/office/powerpoint/2010/main" val="4293126687"/>
       </p:ext>
     </p:extLst>
   </p:cSld>
@@ -11877,7 +11707,7 @@
     <a:masterClrMapping/>
   </p:clrMapOvr>
   <mc:AlternateContent xmlns:mc="http://schemas.openxmlformats.org/markup-compatibility/2006">
-    <mc:Choice xmlns:p14="http://schemas.microsoft.com/office/powerpoint/2010/main" xmlns="" Requires="p14">
+    <mc:Choice xmlns="" xmlns:p14="http://schemas.microsoft.com/office/powerpoint/2010/main" Requires="p14">
       <p:transition spd="slow" p14:dur="2000" advTm="25932"/>
     </mc:Choice>
     <mc:Fallback>
@@ -11959,7 +11789,7 @@
     </p:custDataLst>
     <p:extLst>
       <p:ext uri="{BB962C8B-B14F-4D97-AF65-F5344CB8AC3E}">
-        <p14:creationId xmlns:p14="http://schemas.microsoft.com/office/powerpoint/2010/main" xmlns="" val="3726194390"/>
+        <p14:creationId xmlns="" xmlns:p14="http://schemas.microsoft.com/office/powerpoint/2010/main" val="3726194390"/>
       </p:ext>
     </p:extLst>
   </p:cSld>
@@ -11967,7 +11797,7 @@
     <a:masterClrMapping/>
   </p:clrMapOvr>
   <mc:AlternateContent xmlns:mc="http://schemas.openxmlformats.org/markup-compatibility/2006">
-    <mc:Choice xmlns:p14="http://schemas.microsoft.com/office/powerpoint/2010/main" xmlns="" Requires="p14">
+    <mc:Choice xmlns="" xmlns:p14="http://schemas.microsoft.com/office/powerpoint/2010/main" Requires="p14">
       <p:transition spd="slow" p14:dur="2000" advTm="147542"/>
     </mc:Choice>
     <mc:Fallback>
@@ -12167,13 +11997,6 @@
               </a:rPr>
               <a:t>Soluzione</a:t>
             </a:r>
-            <a:endParaRPr lang="it-IT" sz="2400" dirty="0" smtClean="0">
-              <a:solidFill>
-                <a:schemeClr val="bg1">
-                  <a:lumMod val="50000"/>
-                </a:schemeClr>
-              </a:solidFill>
-            </a:endParaRPr>
           </a:p>
           <a:p>
             <a:pPr marL="457200" indent="-457200">
@@ -12225,7 +12048,7 @@
     </p:spTree>
     <p:extLst>
       <p:ext uri="{BB962C8B-B14F-4D97-AF65-F5344CB8AC3E}">
-        <p14:creationId xmlns:p14="http://schemas.microsoft.com/office/powerpoint/2010/main" xmlns="" val="4293126687"/>
+        <p14:creationId xmlns="" xmlns:p14="http://schemas.microsoft.com/office/powerpoint/2010/main" val="4293126687"/>
       </p:ext>
     </p:extLst>
   </p:cSld>
@@ -12233,7 +12056,7 @@
     <a:masterClrMapping/>
   </p:clrMapOvr>
   <mc:AlternateContent xmlns:mc="http://schemas.openxmlformats.org/markup-compatibility/2006">
-    <mc:Choice xmlns:p14="http://schemas.microsoft.com/office/powerpoint/2010/main" xmlns="" Requires="p14">
+    <mc:Choice xmlns="" xmlns:p14="http://schemas.microsoft.com/office/powerpoint/2010/main" Requires="p14">
       <p:transition spd="slow" p14:dur="2000" advTm="25932"/>
     </mc:Choice>
     <mc:Fallback>
@@ -12330,31 +12153,7 @@
                   <a:schemeClr val="tx1"/>
                 </a:solidFill>
               </a:rPr>
-              <a:t>Rilasciato </a:t>
-            </a:r>
-            <a:r>
-              <a:rPr lang="it-IT" sz="2400" dirty="0" smtClean="0">
-                <a:solidFill>
-                  <a:schemeClr val="tx1"/>
-                </a:solidFill>
-              </a:rPr>
-              <a:t>nel 2010, </a:t>
-            </a:r>
-            <a:r>
-              <a:rPr lang="it-IT" sz="2400" dirty="0" smtClean="0">
-                <a:solidFill>
-                  <a:schemeClr val="tx1"/>
-                </a:solidFill>
-              </a:rPr>
-              <a:t>con la versione </a:t>
-            </a:r>
-            <a:r>
-              <a:rPr lang="it-IT" sz="2400" dirty="0" smtClean="0">
-                <a:solidFill>
-                  <a:schemeClr val="tx1"/>
-                </a:solidFill>
-              </a:rPr>
-              <a:t>v4.0</a:t>
+              <a:t>Rilasciato nel 2010, con la versione v4.0</a:t>
             </a:r>
           </a:p>
           <a:p>
@@ -12368,15 +12167,23 @@
                   <a:schemeClr val="tx1"/>
                 </a:solidFill>
               </a:rPr>
-              <a:t>Niente suddivisione in </a:t>
-            </a:r>
-            <a:r>
-              <a:rPr lang="it-IT" sz="2400" dirty="0" err="1" smtClean="0">
-                <a:solidFill>
-                  <a:schemeClr val="tx1"/>
-                </a:solidFill>
-              </a:rPr>
-              <a:t>calssi</a:t>
+              <a:t>Niente suddivisione </a:t>
+            </a:r>
+            <a:r>
+              <a:rPr lang="it-IT" sz="2400" smtClean="0">
+                <a:solidFill>
+                  <a:schemeClr val="tx1"/>
+                </a:solidFill>
+              </a:rPr>
+              <a:t>in </a:t>
+            </a:r>
+            <a:r>
+              <a:rPr lang="it-IT" sz="2400" smtClean="0">
+                <a:solidFill>
+                  <a:schemeClr val="tx1"/>
+                </a:solidFill>
+              </a:rPr>
+              <a:t>classi</a:t>
             </a:r>
             <a:endParaRPr lang="it-IT" sz="2400" dirty="0" smtClean="0">
               <a:solidFill>
@@ -12533,7 +12340,7 @@
     </p:custDataLst>
     <p:extLst>
       <p:ext uri="{BB962C8B-B14F-4D97-AF65-F5344CB8AC3E}">
-        <p14:creationId xmlns:p14="http://schemas.microsoft.com/office/powerpoint/2010/main" xmlns="" val="2671343476"/>
+        <p14:creationId xmlns="" xmlns:p14="http://schemas.microsoft.com/office/powerpoint/2010/main" val="2671343476"/>
       </p:ext>
     </p:extLst>
   </p:cSld>
@@ -12541,7 +12348,7 @@
     <a:masterClrMapping/>
   </p:clrMapOvr>
   <mc:AlternateContent xmlns:mc="http://schemas.openxmlformats.org/markup-compatibility/2006">
-    <mc:Choice xmlns:p14="http://schemas.microsoft.com/office/powerpoint/2010/main" xmlns="" Requires="p14">
+    <mc:Choice xmlns="" xmlns:p14="http://schemas.microsoft.com/office/powerpoint/2010/main" Requires="p14">
       <p:transition spd="slow" p14:dur="2000" advTm="157969"/>
     </mc:Choice>
     <mc:Fallback>
@@ -13103,15 +12910,7 @@
                 <a:ea typeface="Verdana" pitchFamily="34" charset="0"/>
                 <a:cs typeface="Verdana" pitchFamily="34" charset="0"/>
               </a:rPr>
-              <a:t> </a:t>
-            </a:r>
-            <a:r>
-              <a:rPr lang="it-IT" b="1" dirty="0" smtClean="0">
-                <a:latin typeface="Verdana" pitchFamily="34" charset="0"/>
-                <a:ea typeface="Verdana" pitchFamily="34" charset="0"/>
-                <a:cs typeface="Verdana" pitchFamily="34" charset="0"/>
-              </a:rPr>
-              <a:t>(</a:t>
+              <a:t> (</a:t>
             </a:r>
             <a:r>
               <a:rPr lang="it-IT" b="1" dirty="0" err="1" smtClean="0">
@@ -13372,7 +13171,7 @@
     </p:custDataLst>
     <p:extLst>
       <p:ext uri="{BB962C8B-B14F-4D97-AF65-F5344CB8AC3E}">
-        <p14:creationId xmlns:p14="http://schemas.microsoft.com/office/powerpoint/2010/main" xmlns="" val="2671343476"/>
+        <p14:creationId xmlns="" xmlns:p14="http://schemas.microsoft.com/office/powerpoint/2010/main" val="2671343476"/>
       </p:ext>
     </p:extLst>
   </p:cSld>
@@ -13380,7 +13179,7 @@
     <a:masterClrMapping/>
   </p:clrMapOvr>
   <mc:AlternateContent xmlns:mc="http://schemas.openxmlformats.org/markup-compatibility/2006">
-    <mc:Choice xmlns:p14="http://schemas.microsoft.com/office/powerpoint/2010/main" xmlns="" Requires="p14">
+    <mc:Choice xmlns="" xmlns:p14="http://schemas.microsoft.com/office/powerpoint/2010/main" Requires="p14">
       <p:transition spd="slow" p14:dur="2000" advTm="157969"/>
     </mc:Choice>
     <mc:Fallback>
@@ -13612,7 +13411,7 @@
     </p:custDataLst>
     <p:extLst>
       <p:ext uri="{BB962C8B-B14F-4D97-AF65-F5344CB8AC3E}">
-        <p14:creationId xmlns:p14="http://schemas.microsoft.com/office/powerpoint/2010/main" xmlns="" val="2671343476"/>
+        <p14:creationId xmlns="" xmlns:p14="http://schemas.microsoft.com/office/powerpoint/2010/main" val="2671343476"/>
       </p:ext>
     </p:extLst>
   </p:cSld>
@@ -13620,7 +13419,7 @@
     <a:masterClrMapping/>
   </p:clrMapOvr>
   <mc:AlternateContent xmlns:mc="http://schemas.openxmlformats.org/markup-compatibility/2006">
-    <mc:Choice xmlns:p14="http://schemas.microsoft.com/office/powerpoint/2010/main" xmlns="" Requires="p14">
+    <mc:Choice xmlns="" xmlns:p14="http://schemas.microsoft.com/office/powerpoint/2010/main" Requires="p14">
       <p:transition spd="slow" p14:dur="2000" advTm="157969"/>
     </mc:Choice>
     <mc:Fallback>
@@ -13820,13 +13619,6 @@
               </a:rPr>
               <a:t>Soluzione</a:t>
             </a:r>
-            <a:endParaRPr lang="it-IT" sz="2400" dirty="0" smtClean="0">
-              <a:solidFill>
-                <a:schemeClr val="bg1">
-                  <a:lumMod val="50000"/>
-                </a:schemeClr>
-              </a:solidFill>
-            </a:endParaRPr>
           </a:p>
           <a:p>
             <a:pPr marL="457200" indent="-457200">
@@ -13878,7 +13670,7 @@
     </p:spTree>
     <p:extLst>
       <p:ext uri="{BB962C8B-B14F-4D97-AF65-F5344CB8AC3E}">
-        <p14:creationId xmlns:p14="http://schemas.microsoft.com/office/powerpoint/2010/main" xmlns="" val="4293126687"/>
+        <p14:creationId xmlns="" xmlns:p14="http://schemas.microsoft.com/office/powerpoint/2010/main" val="4293126687"/>
       </p:ext>
     </p:extLst>
   </p:cSld>
@@ -13886,7 +13678,7 @@
     <a:masterClrMapping/>
   </p:clrMapOvr>
   <mc:AlternateContent xmlns:mc="http://schemas.openxmlformats.org/markup-compatibility/2006">
-    <mc:Choice xmlns:p14="http://schemas.microsoft.com/office/powerpoint/2010/main" xmlns="" Requires="p14">
+    <mc:Choice xmlns="" xmlns:p14="http://schemas.microsoft.com/office/powerpoint/2010/main" Requires="p14">
       <p:transition spd="slow" p14:dur="2000" advTm="25932"/>
     </mc:Choice>
     <mc:Fallback>

</xml_diff>